<commit_message>
Modify PPTX's flowchart with new numbers
</commit_message>
<xml_diff>
--- a/results/Flow chart SOFA.pptx
+++ b/results/Flow chart SOFA.pptx
@@ -197,7 +197,7 @@
           <a:p>
             <a:fld id="{3EEE108C-EB67-DA4C-A2B8-5DDAA9AACF1E}" type="datetimeFigureOut">
               <a:rPr lang="de-CH" smtClean="0"/>
-              <a:t>09.02.23</a:t>
+              <a:t>09.02.2023</a:t>
             </a:fld>
             <a:endParaRPr lang="de-CH"/>
           </a:p>
@@ -1896,7 +1896,7 @@
             <a:fld id="{4B6055F8-1D02-4417-9241-55C834FD9970}" type="datetimeFigureOut">
               <a:rPr lang="it-IT" smtClean="0"/>
               <a:pPr/>
-              <a:t>09/02/23</a:t>
+              <a:t>09/02/2023</a:t>
             </a:fld>
             <a:endParaRPr lang="it-IT"/>
           </a:p>
@@ -4417,7 +4417,7 @@
               </a14:hiddenLine>
             </a:ext>
             <a:ext uri="{FAA26D3D-D897-4be2-8F04-BA451C77F1D7}">
-              <ma14:placeholderFlag xmlns="" xmlns:ma14="http://schemas.microsoft.com/office/mac/drawingml/2011/main" val="1"/>
+              <ma14:placeholderFlag xmlns:ma14="http://schemas.microsoft.com/office/mac/drawingml/2011/main" xmlns="" val="1"/>
             </a:ext>
           </a:extLst>
         </p:spPr>
@@ -4473,7 +4473,7 @@
               </a14:hiddenLine>
             </a:ext>
             <a:ext uri="{FAA26D3D-D897-4be2-8F04-BA451C77F1D7}">
-              <ma14:placeholderFlag xmlns="" xmlns:ma14="http://schemas.microsoft.com/office/mac/drawingml/2011/main" val="1"/>
+              <ma14:placeholderFlag xmlns:ma14="http://schemas.microsoft.com/office/mac/drawingml/2011/main" xmlns="" val="1"/>
             </a:ext>
           </a:extLst>
         </p:spPr>
@@ -5052,7 +5052,7 @@
                 <a:latin typeface="Arial" panose="020B0604020202020204" pitchFamily="34" charset="0"/>
                 <a:cs typeface="Arial" panose="020B0604020202020204" pitchFamily="34" charset="0"/>
               </a:rPr>
-              <a:t>Recurrent ICU stays (n=22,261)</a:t>
+              <a:t>LOS &lt; 24 hours (n=15,753)</a:t>
             </a:r>
           </a:p>
           <a:p>
@@ -5065,7 +5065,7 @@
                 <a:latin typeface="Arial" panose="020B0604020202020204" pitchFamily="34" charset="0"/>
                 <a:cs typeface="Arial" panose="020B0604020202020204" pitchFamily="34" charset="0"/>
               </a:rPr>
-              <a:t>LOS &lt; 24 hours (n=10,962)</a:t>
+              <a:t>Recurrent ICU stays (n=15,375)</a:t>
             </a:r>
           </a:p>
           <a:p>
@@ -5078,7 +5078,7 @@
                 <a:latin typeface="Arial" panose="020B0604020202020204" pitchFamily="34" charset="0"/>
                 <a:cs typeface="Arial" panose="020B0604020202020204" pitchFamily="34" charset="0"/>
               </a:rPr>
-              <a:t>CABG surgery (n=3,421)</a:t>
+              <a:t>CABG surgery (n=3,541)</a:t>
             </a:r>
           </a:p>
           <a:p>
@@ -5091,7 +5091,7 @@
                 <a:latin typeface="Arial" panose="020B0604020202020204" pitchFamily="34" charset="0"/>
                 <a:cs typeface="Arial" panose="020B0604020202020204" pitchFamily="34" charset="0"/>
               </a:rPr>
-              <a:t>Information on GCS missing (n=1,181)</a:t>
+              <a:t>Information on GCS missing (n=1,238)</a:t>
             </a:r>
           </a:p>
         </p:txBody>
@@ -5226,7 +5226,7 @@
           <a:p>
             <a:r>
               <a:rPr lang="en-US" dirty="0"/>
-              <a:t>35,356 adult ICU stays in MIMIC-IV </a:t>
+              <a:t>37,274 adult ICU stays in MIMIC-IV </a:t>
             </a:r>
           </a:p>
           <a:p>
@@ -5342,7 +5342,7 @@
                 <a:latin typeface="Arial" panose="020B0604020202020204" pitchFamily="34" charset="0"/>
                 <a:cs typeface="Arial" panose="020B0604020202020204" pitchFamily="34" charset="0"/>
               </a:rPr>
-              <a:t>Recurrent ICU stays (n=42,417)</a:t>
+              <a:t>LOS &lt; 24 hours (n=68,030)</a:t>
             </a:r>
           </a:p>
           <a:p>
@@ -5355,7 +5355,7 @@
                 <a:latin typeface="Arial" panose="020B0604020202020204" pitchFamily="34" charset="0"/>
                 <a:cs typeface="Arial" panose="020B0604020202020204" pitchFamily="34" charset="0"/>
               </a:rPr>
-              <a:t>LOS &lt; 24 hours (n=47,976)</a:t>
+              <a:t>Recurrent ICU stays (n=11,445)</a:t>
             </a:r>
           </a:p>
           <a:p>
@@ -5368,7 +5368,7 @@
                 <a:latin typeface="Arial" panose="020B0604020202020204" pitchFamily="34" charset="0"/>
                 <a:cs typeface="Arial" panose="020B0604020202020204" pitchFamily="34" charset="0"/>
               </a:rPr>
-              <a:t>CABG surgery (n=4,410)</a:t>
+              <a:t>CABG surgery (n=5,122)</a:t>
             </a:r>
           </a:p>
           <a:p>
@@ -5381,7 +5381,7 @@
                 <a:latin typeface="Arial" panose="020B0604020202020204" pitchFamily="34" charset="0"/>
                 <a:cs typeface="Arial" panose="020B0604020202020204" pitchFamily="34" charset="0"/>
               </a:rPr>
-              <a:t>Information on sex missing and age &lt; 16 (n=149)</a:t>
+              <a:t>Information on sex missing and age &lt; 18 (n=327)</a:t>
             </a:r>
           </a:p>
         </p:txBody>
@@ -5570,7 +5570,7 @@
           <a:p>
             <a:r>
               <a:rPr lang="en-US" dirty="0"/>
-              <a:t>105,907 adult ICU stays in eICU-CRD within first 24 hours</a:t>
+              <a:t>127,380 adult ICU stays in eICU-CRD within first 24 hours</a:t>
             </a:r>
           </a:p>
         </p:txBody>
@@ -5626,7 +5626,7 @@
                 <a:latin typeface="Arial" panose="020B0604020202020204" pitchFamily="34" charset="0"/>
                 <a:cs typeface="Arial" panose="020B0604020202020204" pitchFamily="34" charset="0"/>
               </a:rPr>
-              <a:t>LOS &lt; 7 days (n=30,308)</a:t>
+              <a:t>LOS &lt; 7 days (n=31,983)</a:t>
             </a:r>
           </a:p>
         </p:txBody>
@@ -5759,12 +5759,15 @@
           </a:lstStyle>
           <a:p>
             <a:r>
-              <a:rPr lang="en-US"/>
-              <a:t>5,048 </a:t>
-            </a:r>
-            <a:r>
               <a:rPr lang="en-US" dirty="0"/>
-              <a:t>adult ICU stays in MIMIC-IV within first 7 days</a:t>
+              <a:t>5,291 adult ICU stays in MIMIC-IV within</a:t>
+            </a:r>
+            <a:br>
+              <a:rPr lang="en-US" dirty="0"/>
+            </a:br>
+            <a:r>
+              <a:rPr lang="en-US" dirty="0"/>
+              <a:t>first 7 days</a:t>
             </a:r>
           </a:p>
         </p:txBody>
@@ -5820,7 +5823,7 @@
                 <a:latin typeface="Arial" panose="020B0604020202020204" pitchFamily="34" charset="0"/>
                 <a:cs typeface="Arial" panose="020B0604020202020204" pitchFamily="34" charset="0"/>
               </a:rPr>
-              <a:t>LOS &lt; 7 days (n=94,216)</a:t>
+              <a:t>LOS &lt; 7 days (n=112,810)</a:t>
             </a:r>
           </a:p>
         </p:txBody>
@@ -5954,7 +5957,22 @@
           <a:p>
             <a:r>
               <a:rPr lang="en-US" dirty="0"/>
-              <a:t>11,691 adult ICU stays in eICU-CRD within first 7 days</a:t>
+              <a:t>14,570 adult ICU stays in </a:t>
+            </a:r>
+            <a:r>
+              <a:rPr lang="en-US" dirty="0" err="1"/>
+              <a:t>eICU</a:t>
+            </a:r>
+            <a:r>
+              <a:rPr lang="en-US" dirty="0"/>
+              <a:t>-CRD</a:t>
+            </a:r>
+            <a:br>
+              <a:rPr lang="en-US" dirty="0"/>
+            </a:br>
+            <a:r>
+              <a:rPr lang="en-US" dirty="0"/>
+              <a:t>within first 7 days</a:t>
             </a:r>
           </a:p>
         </p:txBody>
@@ -6020,7 +6038,11 @@
           <a:prstGeom prst="rect">
             <a:avLst/>
           </a:prstGeom>
-          <a:noFill/>
+          <a:solidFill>
+            <a:schemeClr val="bg1">
+              <a:lumMod val="85000"/>
+            </a:schemeClr>
+          </a:solidFill>
           <a:ln>
             <a:solidFill>
               <a:schemeClr val="tx1"/>
@@ -6104,7 +6126,11 @@
           <a:prstGeom prst="rect">
             <a:avLst/>
           </a:prstGeom>
-          <a:noFill/>
+          <a:solidFill>
+            <a:schemeClr val="bg1">
+              <a:lumMod val="85000"/>
+            </a:schemeClr>
+          </a:solidFill>
           <a:ln>
             <a:solidFill>
               <a:schemeClr val="tx1"/>
@@ -6188,7 +6214,11 @@
           <a:prstGeom prst="rect">
             <a:avLst/>
           </a:prstGeom>
-          <a:noFill/>
+          <a:solidFill>
+            <a:schemeClr val="bg1">
+              <a:lumMod val="85000"/>
+            </a:schemeClr>
+          </a:solidFill>
           <a:ln>
             <a:solidFill>
               <a:schemeClr val="tx1"/>
@@ -6272,7 +6302,11 @@
           <a:prstGeom prst="rect">
             <a:avLst/>
           </a:prstGeom>
-          <a:noFill/>
+          <a:solidFill>
+            <a:schemeClr val="bg1">
+              <a:lumMod val="85000"/>
+            </a:schemeClr>
+          </a:solidFill>
           <a:ln>
             <a:solidFill>
               <a:schemeClr val="tx1"/>
@@ -7690,18 +7724,18 @@
 </file>
 
 <file path=customXml/item2.xml><?xml version="1.0" encoding="utf-8"?>
-<p:properties xmlns:p="http://schemas.microsoft.com/office/2006/metadata/properties" xmlns:xsi="http://www.w3.org/2001/XMLSchema-instance" xmlns:pc="http://schemas.microsoft.com/office/infopath/2007/PartnerControls">
-  <documentManagement/>
-</p:properties>
-</file>
-
-<file path=customXml/item3.xml><?xml version="1.0" encoding="utf-8"?>
 <?mso-contentType ?>
 <FormTemplates xmlns="http://schemas.microsoft.com/sharepoint/v3/contenttype/forms">
   <Display>DocumentLibraryForm</Display>
   <Edit>DocumentLibraryForm</Edit>
   <New>DocumentLibraryForm</New>
 </FormTemplates>
+</file>
+
+<file path=customXml/item3.xml><?xml version="1.0" encoding="utf-8"?>
+<p:properties xmlns:p="http://schemas.microsoft.com/office/2006/metadata/properties" xmlns:xsi="http://www.w3.org/2001/XMLSchema-instance" xmlns:pc="http://schemas.microsoft.com/office/infopath/2007/PartnerControls">
+  <documentManagement/>
+</p:properties>
 </file>
 
 <file path=customXml/itemProps1.xml><?xml version="1.0" encoding="utf-8"?>
@@ -7724,6 +7758,14 @@
 </file>
 
 <file path=customXml/itemProps2.xml><?xml version="1.0" encoding="utf-8"?>
+<ds:datastoreItem xmlns:ds="http://schemas.openxmlformats.org/officeDocument/2006/customXml" ds:itemID="{9FA18103-7F7B-4DF6-B5E4-0AF29ECCC122}">
+  <ds:schemaRefs>
+    <ds:schemaRef ds:uri="http://schemas.microsoft.com/sharepoint/v3/contenttype/forms"/>
+  </ds:schemaRefs>
+</ds:datastoreItem>
+</file>
+
+<file path=customXml/itemProps3.xml><?xml version="1.0" encoding="utf-8"?>
 <ds:datastoreItem xmlns:ds="http://schemas.openxmlformats.org/officeDocument/2006/customXml" ds:itemID="{1A94CC53-2CAC-471B-9BA4-2797B3DA82E3}">
   <ds:schemaRefs>
     <ds:schemaRef ds:uri="0c7ed570-c004-4df7-b924-f6f15cff9822"/>
@@ -7738,12 +7780,4 @@
     <ds:schemaRef ds:uri="http://www.w3.org/XML/1998/namespace"/>
   </ds:schemaRefs>
 </ds:datastoreItem>
-</file>
-
-<file path=customXml/itemProps3.xml><?xml version="1.0" encoding="utf-8"?>
-<ds:datastoreItem xmlns:ds="http://schemas.openxmlformats.org/officeDocument/2006/customXml" ds:itemID="{9FA18103-7F7B-4DF6-B5E4-0AF29ECCC122}">
-  <ds:schemaRefs>
-    <ds:schemaRef ds:uri="http://schemas.microsoft.com/sharepoint/v3/contenttype/forms"/>
-  </ds:schemaRefs>
-</ds:datastoreItem>
 </file>
</xml_diff>

<commit_message>
Remove elective patients instead of CABG
</commit_message>
<xml_diff>
--- a/results/Flow chart SOFA.pptx
+++ b/results/Flow chart SOFA.pptx
@@ -197,7 +197,7 @@
           <a:p>
             <a:fld id="{3EEE108C-EB67-DA4C-A2B8-5DDAA9AACF1E}" type="datetimeFigureOut">
               <a:rPr lang="de-CH" smtClean="0"/>
-              <a:t>09.02.2023</a:t>
+              <a:t>11.02.2023</a:t>
             </a:fld>
             <a:endParaRPr lang="de-CH"/>
           </a:p>
@@ -1896,7 +1896,7 @@
             <a:fld id="{4B6055F8-1D02-4417-9241-55C834FD9970}" type="datetimeFigureOut">
               <a:rPr lang="it-IT" smtClean="0"/>
               <a:pPr/>
-              <a:t>09/02/2023</a:t>
+              <a:t>11/02/2023</a:t>
             </a:fld>
             <a:endParaRPr lang="it-IT"/>
           </a:p>
@@ -4417,7 +4417,7 @@
               </a14:hiddenLine>
             </a:ext>
             <a:ext uri="{FAA26D3D-D897-4be2-8F04-BA451C77F1D7}">
-              <ma14:placeholderFlag xmlns:ma14="http://schemas.microsoft.com/office/mac/drawingml/2011/main" xmlns="" val="1"/>
+              <ma14:placeholderFlag xmlns="" xmlns:ma14="http://schemas.microsoft.com/office/mac/drawingml/2011/main" val="1"/>
             </a:ext>
           </a:extLst>
         </p:spPr>
@@ -4473,7 +4473,7 @@
               </a14:hiddenLine>
             </a:ext>
             <a:ext uri="{FAA26D3D-D897-4be2-8F04-BA451C77F1D7}">
-              <ma14:placeholderFlag xmlns:ma14="http://schemas.microsoft.com/office/mac/drawingml/2011/main" xmlns="" val="1"/>
+              <ma14:placeholderFlag xmlns="" xmlns:ma14="http://schemas.microsoft.com/office/mac/drawingml/2011/main" val="1"/>
             </a:ext>
           </a:extLst>
         </p:spPr>
@@ -5078,7 +5078,7 @@
                 <a:latin typeface="Arial" panose="020B0604020202020204" pitchFamily="34" charset="0"/>
                 <a:cs typeface="Arial" panose="020B0604020202020204" pitchFamily="34" charset="0"/>
               </a:rPr>
-              <a:t>CABG surgery (n=3,541)</a:t>
+              <a:t>Elective Admission (n=6,939)</a:t>
             </a:r>
           </a:p>
           <a:p>
@@ -5091,7 +5091,7 @@
                 <a:latin typeface="Arial" panose="020B0604020202020204" pitchFamily="34" charset="0"/>
                 <a:cs typeface="Arial" panose="020B0604020202020204" pitchFamily="34" charset="0"/>
               </a:rPr>
-              <a:t>Information on GCS missing (n=1,238)</a:t>
+              <a:t>Information on GCS missing (n=1,146)</a:t>
             </a:r>
           </a:p>
         </p:txBody>
@@ -5226,7 +5226,7 @@
           <a:p>
             <a:r>
               <a:rPr lang="en-US" dirty="0"/>
-              <a:t>37,274 adult ICU stays in MIMIC-IV </a:t>
+              <a:t>33,968 adult ICU stays in MIMIC-IV </a:t>
             </a:r>
           </a:p>
           <a:p>
@@ -5368,7 +5368,7 @@
                 <a:latin typeface="Arial" panose="020B0604020202020204" pitchFamily="34" charset="0"/>
                 <a:cs typeface="Arial" panose="020B0604020202020204" pitchFamily="34" charset="0"/>
               </a:rPr>
-              <a:t>CABG surgery (n=5,122)</a:t>
+              <a:t>Information on sex missing and age &lt; 18 (n=327)</a:t>
             </a:r>
           </a:p>
           <a:p>
@@ -5381,7 +5381,7 @@
                 <a:latin typeface="Arial" panose="020B0604020202020204" pitchFamily="34" charset="0"/>
                 <a:cs typeface="Arial" panose="020B0604020202020204" pitchFamily="34" charset="0"/>
               </a:rPr>
-              <a:t>Information on sex missing and age &lt; 18 (n=327)</a:t>
+              <a:t>Elective Admission (n=19,384)</a:t>
             </a:r>
           </a:p>
         </p:txBody>
@@ -5570,7 +5570,7 @@
           <a:p>
             <a:r>
               <a:rPr lang="en-US" dirty="0"/>
-              <a:t>127,380 adult ICU stays in eICU-CRD within first 24 hours</a:t>
+              <a:t>113,118 adult ICU stays in eICU-CRD within first 24 hours</a:t>
             </a:r>
           </a:p>
         </p:txBody>
@@ -5626,8 +5626,19 @@
                 <a:latin typeface="Arial" panose="020B0604020202020204" pitchFamily="34" charset="0"/>
                 <a:cs typeface="Arial" panose="020B0604020202020204" pitchFamily="34" charset="0"/>
               </a:rPr>
-              <a:t>LOS &lt; 7 days (n=31,983)</a:t>
-            </a:r>
+              <a:t>LOS &lt; 7 days (</a:t>
+            </a:r>
+            <a:r>
+              <a:rPr lang="en-US" sz="1200">
+                <a:latin typeface="Arial" panose="020B0604020202020204" pitchFamily="34" charset="0"/>
+                <a:cs typeface="Arial" panose="020B0604020202020204" pitchFamily="34" charset="0"/>
+              </a:rPr>
+              <a:t>n=29,042)</a:t>
+            </a:r>
+            <a:endParaRPr lang="en-US" sz="1200" dirty="0">
+              <a:latin typeface="Arial" panose="020B0604020202020204" pitchFamily="34" charset="0"/>
+              <a:cs typeface="Arial" panose="020B0604020202020204" pitchFamily="34" charset="0"/>
+            </a:endParaRPr>
           </a:p>
         </p:txBody>
       </p:sp>
@@ -5823,7 +5834,7 @@
                 <a:latin typeface="Arial" panose="020B0604020202020204" pitchFamily="34" charset="0"/>
                 <a:cs typeface="Arial" panose="020B0604020202020204" pitchFamily="34" charset="0"/>
               </a:rPr>
-              <a:t>LOS &lt; 7 days (n=112,810)</a:t>
+              <a:t>LOS &lt; 7 days (n=102,465)</a:t>
             </a:r>
           </a:p>
         </p:txBody>
@@ -5957,7 +5968,7 @@
           <a:p>
             <a:r>
               <a:rPr lang="en-US" dirty="0"/>
-              <a:t>14,570 adult ICU stays in </a:t>
+              <a:t>10,653 adult ICU stays in </a:t>
             </a:r>
             <a:r>
               <a:rPr lang="en-US" dirty="0" err="1"/>
@@ -7724,18 +7735,18 @@
 </file>
 
 <file path=customXml/item2.xml><?xml version="1.0" encoding="utf-8"?>
+<p:properties xmlns:p="http://schemas.microsoft.com/office/2006/metadata/properties" xmlns:xsi="http://www.w3.org/2001/XMLSchema-instance" xmlns:pc="http://schemas.microsoft.com/office/infopath/2007/PartnerControls">
+  <documentManagement/>
+</p:properties>
+</file>
+
+<file path=customXml/item3.xml><?xml version="1.0" encoding="utf-8"?>
 <?mso-contentType ?>
 <FormTemplates xmlns="http://schemas.microsoft.com/sharepoint/v3/contenttype/forms">
   <Display>DocumentLibraryForm</Display>
   <Edit>DocumentLibraryForm</Edit>
   <New>DocumentLibraryForm</New>
 </FormTemplates>
-</file>
-
-<file path=customXml/item3.xml><?xml version="1.0" encoding="utf-8"?>
-<p:properties xmlns:p="http://schemas.microsoft.com/office/2006/metadata/properties" xmlns:xsi="http://www.w3.org/2001/XMLSchema-instance" xmlns:pc="http://schemas.microsoft.com/office/infopath/2007/PartnerControls">
-  <documentManagement/>
-</p:properties>
 </file>
 
 <file path=customXml/itemProps1.xml><?xml version="1.0" encoding="utf-8"?>
@@ -7758,14 +7769,6 @@
 </file>
 
 <file path=customXml/itemProps2.xml><?xml version="1.0" encoding="utf-8"?>
-<ds:datastoreItem xmlns:ds="http://schemas.openxmlformats.org/officeDocument/2006/customXml" ds:itemID="{9FA18103-7F7B-4DF6-B5E4-0AF29ECCC122}">
-  <ds:schemaRefs>
-    <ds:schemaRef ds:uri="http://schemas.microsoft.com/sharepoint/v3/contenttype/forms"/>
-  </ds:schemaRefs>
-</ds:datastoreItem>
-</file>
-
-<file path=customXml/itemProps3.xml><?xml version="1.0" encoding="utf-8"?>
 <ds:datastoreItem xmlns:ds="http://schemas.openxmlformats.org/officeDocument/2006/customXml" ds:itemID="{1A94CC53-2CAC-471B-9BA4-2797B3DA82E3}">
   <ds:schemaRefs>
     <ds:schemaRef ds:uri="0c7ed570-c004-4df7-b924-f6f15cff9822"/>
@@ -7780,4 +7783,12 @@
     <ds:schemaRef ds:uri="http://www.w3.org/XML/1998/namespace"/>
   </ds:schemaRefs>
 </ds:datastoreItem>
+</file>
+
+<file path=customXml/itemProps3.xml><?xml version="1.0" encoding="utf-8"?>
+<ds:datastoreItem xmlns:ds="http://schemas.openxmlformats.org/officeDocument/2006/customXml" ds:itemID="{9FA18103-7F7B-4DF6-B5E4-0AF29ECCC122}">
+  <ds:schemaRefs>
+    <ds:schemaRef ds:uri="http://schemas.microsoft.com/sharepoint/v3/contenttype/forms"/>
+  </ds:schemaRefs>
+</ds:datastoreItem>
 </file>
</xml_diff>